<commit_message>
Adds a few editing changes
</commit_message>
<xml_diff>
--- a/session_04/Session_04-Spring_Data.pptx
+++ b/session_04/Session_04-Spring_Data.pptx
@@ -6688,15 +6688,23 @@
           <a:p>
             <a:r>
               <a:rPr lang="en-US" sz="1800" dirty="0"/>
-              <a:t>The path is derived from the </a:t>
-            </a:r>
-            <a:r>
-              <a:rPr lang="en-US" sz="1800" dirty="0" err="1"/>
-              <a:t>uncapitalized</a:t>
+              <a:t>The path is derived from </a:t>
+            </a:r>
+            <a:r>
+              <a:rPr lang="en-US" sz="1800"/>
+              <a:t>the </a:t>
+            </a:r>
+            <a:r>
+              <a:rPr lang="en-US" sz="1800" smtClean="0"/>
+              <a:t>un-capitalized</a:t>
+            </a:r>
+            <a:r>
+              <a:rPr lang="en-US" sz="1800" dirty="0" smtClean="0"/>
+              <a:t>, </a:t>
             </a:r>
             <a:r>
               <a:rPr lang="en-US" sz="1800" dirty="0"/>
-              <a:t>, pluralized, simple class name of the domain class being managed.</a:t>
+              <a:t>pluralized, simple class name of the domain class being managed.</a:t>
             </a:r>
           </a:p>
           <a:p>

</xml_diff>